<commit_message>
created day 1 ppt for instructor
</commit_message>
<xml_diff>
--- a/SQL/03-aggregates.pptx
+++ b/SQL/03-aggregates.pptx
@@ -22,12 +22,12 @@
     <p:sldId id="312" r:id="rId13"/>
     <p:sldId id="313" r:id="rId14"/>
     <p:sldId id="321" r:id="rId15"/>
-    <p:sldId id="315" r:id="rId16"/>
-    <p:sldId id="316" r:id="rId17"/>
-    <p:sldId id="317" r:id="rId18"/>
-    <p:sldId id="322" r:id="rId19"/>
-    <p:sldId id="319" r:id="rId20"/>
-    <p:sldId id="323" r:id="rId21"/>
+    <p:sldId id="325" r:id="rId16"/>
+    <p:sldId id="327" r:id="rId17"/>
+    <p:sldId id="316" r:id="rId18"/>
+    <p:sldId id="329" r:id="rId19"/>
+    <p:sldId id="328" r:id="rId20"/>
+    <p:sldId id="322" r:id="rId21"/>
     <p:sldId id="314" r:id="rId22"/>
     <p:sldId id="318" r:id="rId23"/>
     <p:sldId id="324" r:id="rId24"/>
@@ -297,7 +297,7 @@
               <a:pPr>
                 <a:defRPr/>
               </a:pPr>
-              <a:t>12/5/23</a:t>
+              <a:t>12/26/23</a:t>
             </a:fld>
             <a:endParaRPr lang="en-US" dirty="0"/>
           </a:p>
@@ -507,7 +507,7 @@
               <a:pPr>
                 <a:defRPr/>
               </a:pPr>
-              <a:t>12/5/23</a:t>
+              <a:t>12/26/23</a:t>
             </a:fld>
             <a:endParaRPr lang="en-US" dirty="0"/>
           </a:p>
@@ -1155,10 +1155,7 @@
           <a:bodyPr/>
           <a:lstStyle/>
           <a:p>
-            <a:r>
-              <a:rPr lang="en-US" dirty="0"/>
-              <a:t>Give us your speaking points</a:t>
-            </a:r>
+            <a:endParaRPr lang="en-US" dirty="0"/>
           </a:p>
         </p:txBody>
       </p:sp>
@@ -1185,96 +1182,6 @@
               <a:pPr>
                 <a:defRPr/>
               </a:pPr>
-              <a:t>11</a:t>
-            </a:fld>
-            <a:endParaRPr lang="en-US" dirty="0"/>
-          </a:p>
-        </p:txBody>
-      </p:sp>
-    </p:spTree>
-    <p:extLst>
-      <p:ext uri="{BB962C8B-B14F-4D97-AF65-F5344CB8AC3E}">
-        <p14:creationId xmlns:p14="http://schemas.microsoft.com/office/powerpoint/2010/main" val="3891216438"/>
-      </p:ext>
-    </p:extLst>
-  </p:cSld>
-  <p:clrMapOvr>
-    <a:masterClrMapping/>
-  </p:clrMapOvr>
-</p:notes>
-</file>
-
-<file path=ppt/notesSlides/notesSlide3.xml><?xml version="1.0" encoding="utf-8"?>
-<p:notes xmlns:a="http://schemas.openxmlformats.org/drawingml/2006/main" xmlns:r="http://schemas.openxmlformats.org/officeDocument/2006/relationships" xmlns:p="http://schemas.openxmlformats.org/presentationml/2006/main">
-  <p:cSld>
-    <p:spTree>
-      <p:nvGrpSpPr>
-        <p:cNvPr id="1" name=""/>
-        <p:cNvGrpSpPr/>
-        <p:nvPr/>
-      </p:nvGrpSpPr>
-      <p:grpSpPr>
-        <a:xfrm>
-          <a:off x="0" y="0"/>
-          <a:ext cx="0" cy="0"/>
-          <a:chOff x="0" y="0"/>
-          <a:chExt cx="0" cy="0"/>
-        </a:xfrm>
-      </p:grpSpPr>
-      <p:sp>
-        <p:nvSpPr>
-          <p:cNvPr id="2" name="Slide Image Placeholder 1"/>
-          <p:cNvSpPr>
-            <a:spLocks noGrp="1" noRot="1" noChangeAspect="1"/>
-          </p:cNvSpPr>
-          <p:nvPr>
-            <p:ph type="sldImg"/>
-          </p:nvPr>
-        </p:nvSpPr>
-        <p:spPr/>
-      </p:sp>
-      <p:sp>
-        <p:nvSpPr>
-          <p:cNvPr id="3" name="Notes Placeholder 2"/>
-          <p:cNvSpPr>
-            <a:spLocks noGrp="1"/>
-          </p:cNvSpPr>
-          <p:nvPr>
-            <p:ph type="body" idx="1"/>
-          </p:nvPr>
-        </p:nvSpPr>
-        <p:spPr/>
-        <p:txBody>
-          <a:bodyPr/>
-          <a:lstStyle/>
-          <a:p>
-            <a:endParaRPr lang="en-US" dirty="0"/>
-          </a:p>
-        </p:txBody>
-      </p:sp>
-      <p:sp>
-        <p:nvSpPr>
-          <p:cNvPr id="4" name="Slide Number Placeholder 3"/>
-          <p:cNvSpPr>
-            <a:spLocks noGrp="1"/>
-          </p:cNvSpPr>
-          <p:nvPr>
-            <p:ph type="sldNum" sz="quarter" idx="5"/>
-          </p:nvPr>
-        </p:nvSpPr>
-        <p:spPr/>
-        <p:txBody>
-          <a:bodyPr/>
-          <a:lstStyle/>
-          <a:p>
-            <a:pPr>
-              <a:defRPr/>
-            </a:pPr>
-            <a:fld id="{D0B7D74D-C969-4920-A7A6-E44C909EE3F2}" type="slidenum">
-              <a:rPr lang="en-US" smtClean="0"/>
-              <a:pPr>
-                <a:defRPr/>
-              </a:pPr>
               <a:t>16</a:t>
             </a:fld>
             <a:endParaRPr lang="en-US" dirty="0"/>
@@ -1294,7 +1201,7 @@
 </p:notes>
 </file>
 
-<file path=ppt/notesSlides/notesSlide4.xml><?xml version="1.0" encoding="utf-8"?>
+<file path=ppt/notesSlides/notesSlide3.xml><?xml version="1.0" encoding="utf-8"?>
 <p:notes xmlns:a="http://schemas.openxmlformats.org/drawingml/2006/main" xmlns:r="http://schemas.openxmlformats.org/officeDocument/2006/relationships" xmlns:p="http://schemas.openxmlformats.org/presentationml/2006/main">
   <p:cSld>
     <p:spTree>
@@ -6063,7 +5970,7 @@
           <a:p>
             <a:r>
               <a:rPr lang="en-US" dirty="0"/>
-              <a:t>Function 2</a:t>
+              <a:t>Minimum Function</a:t>
             </a:r>
           </a:p>
         </p:txBody>
@@ -6094,22 +6001,48 @@
           <a:bodyPr/>
           <a:lstStyle/>
           <a:p>
-            <a:pPr marL="0" indent="0" algn="l">
+            <a:pPr marL="0" indent="0">
               <a:buNone/>
             </a:pPr>
             <a:r>
               <a:rPr lang="en-US" b="0" i="0" dirty="0">
                 <a:solidFill>
-                  <a:srgbClr val="24292F"/>
+                  <a:srgbClr val="1C1917"/>
                 </a:solidFill>
                 <a:effectLst/>
                 <a:latin typeface="-apple-system"/>
               </a:rPr>
-              <a:t>MAX Function</a:t>
-            </a:r>
+              <a:t>The MIN() function in SQL is an aggregate function that allows you to find the minimum value from a set of records or values in a particular column of a table.</a:t>
+            </a:r>
+          </a:p>
+          <a:p>
+            <a:pPr marL="457200" lvl="1" indent="0">
+              <a:buNone/>
+            </a:pPr>
+            <a:endParaRPr lang="en-US" dirty="0">
+              <a:solidFill>
+                <a:srgbClr val="1C1917"/>
+              </a:solidFill>
+              <a:latin typeface="-apple-system"/>
+            </a:endParaRPr>
           </a:p>
           <a:p>
             <a:pPr lvl="1"/>
+            <a:r>
+              <a:rPr lang="en-US" b="0" i="0" dirty="0">
+                <a:solidFill>
+                  <a:srgbClr val="1C1917"/>
+                </a:solidFill>
+                <a:effectLst/>
+                <a:latin typeface="-apple-system"/>
+              </a:rPr>
+              <a:t>The basic syntax is:</a:t>
+            </a:r>
+          </a:p>
+          <a:p>
+            <a:pPr marL="457200" lvl="1" indent="0">
+              <a:buNone/>
+            </a:pPr>
             <a:r>
               <a:rPr lang="en-US" b="0" i="0" dirty="0">
                 <a:solidFill>
@@ -6118,8 +6051,110 @@
                 <a:effectLst/>
                 <a:latin typeface="oxygen" panose="020F0502020204030204" pitchFamily="34" charset="0"/>
               </a:rPr>
-              <a:t>This returns the largest value in a given column.</a:t>
-            </a:r>
+              <a:t>	</a:t>
+            </a:r>
+          </a:p>
+          <a:p>
+            <a:pPr marL="457200" lvl="1" indent="0">
+              <a:buNone/>
+            </a:pPr>
+            <a:r>
+              <a:rPr lang="en-US" b="0" i="0" dirty="0">
+                <a:solidFill>
+                  <a:srgbClr val="C678DD"/>
+                </a:solidFill>
+                <a:effectLst/>
+                <a:latin typeface="Fira Code" panose="020B0809050000020004" pitchFamily="49" charset="0"/>
+              </a:rPr>
+              <a:t>	SELECT</a:t>
+            </a:r>
+            <a:r>
+              <a:rPr lang="en-US" b="0" i="0" dirty="0">
+                <a:solidFill>
+                  <a:srgbClr val="ABB2BF"/>
+                </a:solidFill>
+                <a:effectLst/>
+                <a:latin typeface="Fira Code" panose="020B0809050000020004" pitchFamily="49" charset="0"/>
+              </a:rPr>
+              <a:t> </a:t>
+            </a:r>
+            <a:r>
+              <a:rPr lang="en-US" b="0" i="0" dirty="0">
+                <a:solidFill>
+                  <a:srgbClr val="61AFEF"/>
+                </a:solidFill>
+                <a:effectLst/>
+                <a:latin typeface="Fira Code" panose="020B0809050000020004" pitchFamily="49" charset="0"/>
+              </a:rPr>
+              <a:t>MIN</a:t>
+            </a:r>
+            <a:r>
+              <a:rPr lang="en-US" b="0" i="0" dirty="0">
+                <a:solidFill>
+                  <a:srgbClr val="ABB2BF"/>
+                </a:solidFill>
+                <a:effectLst/>
+                <a:latin typeface="Fira Code" panose="020B0809050000020004" pitchFamily="49" charset="0"/>
+              </a:rPr>
+              <a:t>(</a:t>
+            </a:r>
+            <a:r>
+              <a:rPr lang="en-US" b="0" i="0" dirty="0" err="1">
+                <a:solidFill>
+                  <a:srgbClr val="ABB2BF"/>
+                </a:solidFill>
+                <a:effectLst/>
+                <a:latin typeface="Fira Code" panose="020B0809050000020004" pitchFamily="49" charset="0"/>
+              </a:rPr>
+              <a:t>column_name</a:t>
+            </a:r>
+            <a:r>
+              <a:rPr lang="en-US" b="0" i="0" dirty="0">
+                <a:solidFill>
+                  <a:srgbClr val="ABB2BF"/>
+                </a:solidFill>
+                <a:effectLst/>
+                <a:latin typeface="Fira Code" panose="020B0809050000020004" pitchFamily="49" charset="0"/>
+              </a:rPr>
+              <a:t>) </a:t>
+            </a:r>
+            <a:r>
+              <a:rPr lang="en-US" b="0" i="0" dirty="0">
+                <a:solidFill>
+                  <a:srgbClr val="C678DD"/>
+                </a:solidFill>
+                <a:effectLst/>
+                <a:latin typeface="Fira Code" panose="020B0809050000020004" pitchFamily="49" charset="0"/>
+              </a:rPr>
+              <a:t>FROM</a:t>
+            </a:r>
+            <a:r>
+              <a:rPr lang="en-US" b="0" i="0" dirty="0">
+                <a:solidFill>
+                  <a:srgbClr val="ABB2BF"/>
+                </a:solidFill>
+                <a:effectLst/>
+                <a:latin typeface="Fira Code" panose="020B0809050000020004" pitchFamily="49" charset="0"/>
+              </a:rPr>
+              <a:t> </a:t>
+            </a:r>
+            <a:r>
+              <a:rPr lang="en-US" b="0" i="0" dirty="0" err="1">
+                <a:solidFill>
+                  <a:srgbClr val="ABB2BF"/>
+                </a:solidFill>
+                <a:effectLst/>
+                <a:latin typeface="Fira Code" panose="020B0809050000020004" pitchFamily="49" charset="0"/>
+              </a:rPr>
+              <a:t>table_name</a:t>
+            </a:r>
+            <a:endParaRPr lang="en-US" b="0" i="0" dirty="0">
+              <a:solidFill>
+                <a:srgbClr val="2D2D2D"/>
+              </a:solidFill>
+              <a:effectLst/>
+              <a:latin typeface="oxygen" panose="020F0502020204030204" pitchFamily="34" charset="0"/>
+            </a:endParaRPr>
           </a:p>
           <a:p>
             <a:pPr lvl="1"/>
@@ -6135,7 +6170,7 @@
     </p:spTree>
     <p:extLst>
       <p:ext uri="{BB962C8B-B14F-4D97-AF65-F5344CB8AC3E}">
-        <p14:creationId xmlns:p14="http://schemas.microsoft.com/office/powerpoint/2010/main" val="3671803823"/>
+        <p14:creationId xmlns:p14="http://schemas.microsoft.com/office/powerpoint/2010/main" val="490170217"/>
       </p:ext>
     </p:extLst>
   </p:cSld>
@@ -6392,7 +6427,7 @@
           <a:p>
             <a:r>
               <a:rPr lang="en-US" dirty="0"/>
-              <a:t>Function 3</a:t>
+              <a:t>Maximum Function</a:t>
             </a:r>
           </a:p>
         </p:txBody>
@@ -6423,82 +6458,196 @@
           <a:bodyPr/>
           <a:lstStyle/>
           <a:p>
-            <a:pPr algn="l"/>
+            <a:pPr marL="0" indent="0" algn="l">
+              <a:buNone/>
+            </a:pPr>
             <a:r>
               <a:rPr lang="en-US" b="0" i="0" dirty="0">
                 <a:solidFill>
-                  <a:srgbClr val="24292F"/>
+                  <a:srgbClr val="1C1917"/>
                 </a:solidFill>
                 <a:effectLst/>
                 <a:latin typeface="-apple-system"/>
               </a:rPr>
-              <a:t>Average Function</a:t>
-            </a:r>
+              <a:t>The MAX() function in SQL is an aggregate function that allows you to find the maximum value from a set of records or values in a particular column of a table.</a:t>
+            </a:r>
+          </a:p>
+          <a:p>
+            <a:pPr marL="0" indent="0" algn="l">
+              <a:buNone/>
+            </a:pPr>
+            <a:endParaRPr lang="en-US" dirty="0">
+              <a:solidFill>
+                <a:srgbClr val="1C1917"/>
+              </a:solidFill>
+              <a:latin typeface="-apple-system"/>
+            </a:endParaRPr>
           </a:p>
           <a:p>
             <a:pPr lvl="1"/>
             <a:r>
               <a:rPr lang="en-US" b="0" i="0" dirty="0">
                 <a:solidFill>
-                  <a:srgbClr val="2D2D2D"/>
+                  <a:srgbClr val="1C1917"/>
                 </a:solidFill>
                 <a:effectLst/>
-                <a:latin typeface="oxygen" panose="020F0502020204030204" pitchFamily="34" charset="0"/>
+                <a:latin typeface="-apple-system"/>
               </a:rPr>
-              <a:t>This returns the mean value in a given column.</a:t>
-            </a:r>
+              <a:t>The basic syntax is:</a:t>
+            </a:r>
+          </a:p>
+          <a:p>
+            <a:pPr lvl="1"/>
+            <a:endParaRPr lang="en-US" dirty="0">
+              <a:solidFill>
+                <a:srgbClr val="1C1917"/>
+              </a:solidFill>
+              <a:latin typeface="-apple-system"/>
+            </a:endParaRPr>
+          </a:p>
+          <a:p>
+            <a:pPr marL="457200" lvl="1" indent="0">
+              <a:buNone/>
+            </a:pPr>
+            <a:r>
+              <a:rPr lang="en-US" b="0" i="0" dirty="0">
+                <a:solidFill>
+                  <a:srgbClr val="1C1917"/>
+                </a:solidFill>
+                <a:effectLst/>
+                <a:latin typeface="-apple-system"/>
+              </a:rPr>
+              <a:t>	</a:t>
+            </a:r>
+            <a:r>
+              <a:rPr lang="en-US" b="0" i="0" dirty="0">
+                <a:solidFill>
+                  <a:srgbClr val="C678DD"/>
+                </a:solidFill>
+                <a:effectLst/>
+                <a:latin typeface="Fira Code" panose="020B0809050000020004" pitchFamily="49" charset="0"/>
+              </a:rPr>
+              <a:t>SELECT</a:t>
+            </a:r>
+            <a:r>
+              <a:rPr lang="en-US" b="0" i="0" dirty="0">
+                <a:solidFill>
+                  <a:srgbClr val="ABB2BF"/>
+                </a:solidFill>
+                <a:effectLst/>
+                <a:latin typeface="Fira Code" panose="020B0809050000020004" pitchFamily="49" charset="0"/>
+              </a:rPr>
+              <a:t> </a:t>
+            </a:r>
+            <a:r>
+              <a:rPr lang="en-US" b="0" i="0" dirty="0">
+                <a:solidFill>
+                  <a:srgbClr val="61AFEF"/>
+                </a:solidFill>
+                <a:effectLst/>
+                <a:latin typeface="Fira Code" panose="020B0809050000020004" pitchFamily="49" charset="0"/>
+              </a:rPr>
+              <a:t>MAX</a:t>
+            </a:r>
+            <a:r>
+              <a:rPr lang="en-US" b="0" i="0" dirty="0">
+                <a:solidFill>
+                  <a:srgbClr val="ABB2BF"/>
+                </a:solidFill>
+                <a:effectLst/>
+                <a:latin typeface="Fira Code" panose="020B0809050000020004" pitchFamily="49" charset="0"/>
+              </a:rPr>
+              <a:t>(</a:t>
+            </a:r>
+            <a:r>
+              <a:rPr lang="en-US" b="0" i="0" dirty="0" err="1">
+                <a:solidFill>
+                  <a:srgbClr val="ABB2BF"/>
+                </a:solidFill>
+                <a:effectLst/>
+                <a:latin typeface="Fira Code" panose="020B0809050000020004" pitchFamily="49" charset="0"/>
+              </a:rPr>
+              <a:t>column_name</a:t>
+            </a:r>
+            <a:r>
+              <a:rPr lang="en-US" b="0" i="0" dirty="0">
+                <a:solidFill>
+                  <a:srgbClr val="ABB2BF"/>
+                </a:solidFill>
+                <a:effectLst/>
+                <a:latin typeface="Fira Code" panose="020B0809050000020004" pitchFamily="49" charset="0"/>
+              </a:rPr>
+              <a:t>) </a:t>
+            </a:r>
+            <a:r>
+              <a:rPr lang="en-US" b="0" i="0" dirty="0">
+                <a:solidFill>
+                  <a:srgbClr val="C678DD"/>
+                </a:solidFill>
+                <a:effectLst/>
+                <a:latin typeface="Fira Code" panose="020B0809050000020004" pitchFamily="49" charset="0"/>
+              </a:rPr>
+              <a:t>FROM</a:t>
+            </a:r>
+            <a:r>
+              <a:rPr lang="en-US" b="0" i="0" dirty="0">
+                <a:solidFill>
+                  <a:srgbClr val="ABB2BF"/>
+                </a:solidFill>
+                <a:effectLst/>
+                <a:latin typeface="Fira Code" panose="020B0809050000020004" pitchFamily="49" charset="0"/>
+              </a:rPr>
+              <a:t> </a:t>
+            </a:r>
+            <a:r>
+              <a:rPr lang="en-US" b="0" i="0" dirty="0" err="1">
+                <a:solidFill>
+                  <a:srgbClr val="ABB2BF"/>
+                </a:solidFill>
+                <a:effectLst/>
+                <a:latin typeface="Fira Code" panose="020B0809050000020004" pitchFamily="49" charset="0"/>
+              </a:rPr>
+              <a:t>table_name</a:t>
+            </a:r>
+            <a:r>
+              <a:rPr lang="en-US" b="0" i="0" dirty="0">
+                <a:solidFill>
+                  <a:srgbClr val="ABB2BF"/>
+                </a:solidFill>
+                <a:effectLst/>
+                <a:latin typeface="Fira Code" panose="020B0809050000020004" pitchFamily="49" charset="0"/>
+              </a:rPr>
+              <a:t>;</a:t>
+            </a:r>
+          </a:p>
+          <a:p>
+            <a:pPr marL="457200" lvl="1" indent="0">
+              <a:buNone/>
+            </a:pPr>
+            <a:endParaRPr lang="en-US" dirty="0">
+              <a:solidFill>
+                <a:srgbClr val="ABB2BF"/>
+              </a:solidFill>
+              <a:latin typeface="Fira Code" panose="020B0809050000020004" pitchFamily="49" charset="0"/>
+            </a:endParaRPr>
+          </a:p>
+          <a:p>
+            <a:pPr marL="457200" lvl="1" indent="0">
+              <a:buNone/>
+            </a:pPr>
+            <a:endParaRPr lang="en-US" dirty="0">
+              <a:solidFill>
+                <a:srgbClr val="2D2D2D"/>
+              </a:solidFill>
+              <a:latin typeface="oxygen" panose="020F0502020204030204" pitchFamily="34" charset="0"/>
+            </a:endParaRPr>
           </a:p>
         </p:txBody>
       </p:sp>
-      <p:pic>
-        <p:nvPicPr>
-          <p:cNvPr id="2" name="Picture 2" descr="Mean, median and mode">
-            <a:extLst>
-              <a:ext uri="{FF2B5EF4-FFF2-40B4-BE49-F238E27FC236}">
-                <a16:creationId xmlns:a16="http://schemas.microsoft.com/office/drawing/2014/main" id="{B0B6DE5A-747F-1681-8D0C-0B6F792B3361}"/>
-              </a:ext>
-            </a:extLst>
-          </p:cNvPr>
-          <p:cNvPicPr>
-            <a:picLocks noChangeAspect="1" noChangeArrowheads="1"/>
-          </p:cNvPicPr>
-          <p:nvPr/>
-        </p:nvPicPr>
-        <p:blipFill rotWithShape="1">
-          <a:blip r:embed="rId3">
-            <a:extLst>
-              <a:ext uri="{28A0092B-C50C-407E-A947-70E740481C1C}">
-                <a14:useLocalDpi xmlns:a14="http://schemas.microsoft.com/office/drawing/2010/main" val="0"/>
-              </a:ext>
-            </a:extLst>
-          </a:blip>
-          <a:srcRect l="68773" t="1" r="-1" b="25981"/>
-          <a:stretch/>
-        </p:blipFill>
-        <p:spPr bwMode="auto">
-          <a:xfrm>
-            <a:off x="3087102" y="2602484"/>
-            <a:ext cx="2855495" cy="3030454"/>
-          </a:xfrm>
-          <a:prstGeom prst="rect">
-            <a:avLst/>
-          </a:prstGeom>
-          <a:noFill/>
-          <a:extLst>
-            <a:ext uri="{909E8E84-426E-40DD-AFC4-6F175D3DCCD1}">
-              <a14:hiddenFill xmlns:a14="http://schemas.microsoft.com/office/drawing/2010/main">
-                <a:solidFill>
-                  <a:srgbClr val="FFFFFF"/>
-                </a:solidFill>
-              </a14:hiddenFill>
-            </a:ext>
-          </a:extLst>
-        </p:spPr>
-      </p:pic>
     </p:spTree>
     <p:extLst>
       <p:ext uri="{BB962C8B-B14F-4D97-AF65-F5344CB8AC3E}">
-        <p14:creationId xmlns:p14="http://schemas.microsoft.com/office/powerpoint/2010/main" val="1325569747"/>
+        <p14:creationId xmlns:p14="http://schemas.microsoft.com/office/powerpoint/2010/main" val="3671803823"/>
       </p:ext>
     </p:extLst>
   </p:cSld>
@@ -6755,7 +6904,7 @@
           <a:p>
             <a:r>
               <a:rPr lang="en-US" dirty="0"/>
-              <a:t>Agenda</a:t>
+              <a:t>Average Function</a:t>
             </a:r>
           </a:p>
         </p:txBody>
@@ -6786,90 +6935,183 @@
           <a:bodyPr/>
           <a:lstStyle/>
           <a:p>
-            <a:pPr marL="457200" indent="-457200" algn="l">
-              <a:buAutoNum type="arabicPeriod"/>
+            <a:pPr marL="0" indent="0" algn="l">
+              <a:buNone/>
             </a:pPr>
             <a:r>
-              <a:rPr lang="en-US" sz="2800" dirty="0">
-                <a:solidFill>
-                  <a:srgbClr val="24292F"/>
-                </a:solidFill>
+              <a:rPr lang="en-US" b="0" i="0" dirty="0">
+                <a:solidFill>
+                  <a:srgbClr val="1C1917"/>
+                </a:solidFill>
+                <a:effectLst/>
                 <a:latin typeface="-apple-system"/>
               </a:rPr>
-              <a:t>What is an Aggregate?</a:t>
-            </a:r>
-          </a:p>
-          <a:p>
-            <a:pPr marL="457200" indent="-457200" algn="l">
-              <a:buAutoNum type="arabicPeriod"/>
-            </a:pPr>
-            <a:r>
-              <a:rPr lang="en-US" dirty="0">
-                <a:solidFill>
-                  <a:srgbClr val="24292F"/>
-                </a:solidFill>
-                <a:latin typeface="-apple-system"/>
-              </a:rPr>
-              <a:t>Define Function</a:t>
-            </a:r>
-          </a:p>
-          <a:p>
-            <a:pPr marL="457200" indent="-457200" algn="l">
-              <a:buAutoNum type="arabicPeriod"/>
-            </a:pPr>
-            <a:r>
-              <a:rPr lang="en-US" dirty="0">
-                <a:solidFill>
-                  <a:srgbClr val="24292F"/>
-                </a:solidFill>
-                <a:latin typeface="-apple-system"/>
-              </a:rPr>
-              <a:t>SQL Context</a:t>
-            </a:r>
-          </a:p>
-          <a:p>
-            <a:pPr marL="457200" indent="-457200" algn="l">
-              <a:buAutoNum type="arabicPeriod"/>
+              <a:t>The AVG() function in SQL is an aggregate function that allows you to calculate the average value from a numeric column in a table.</a:t>
+            </a:r>
+          </a:p>
+          <a:p>
+            <a:pPr marL="0" indent="0" algn="l">
+              <a:buNone/>
             </a:pPr>
             <a:endParaRPr lang="en-US" dirty="0">
               <a:solidFill>
-                <a:srgbClr val="24292F"/>
+                <a:srgbClr val="1C1917"/>
               </a:solidFill>
               <a:latin typeface="-apple-system"/>
             </a:endParaRPr>
           </a:p>
           <a:p>
-            <a:pPr marL="457200" indent="-457200" algn="l">
-              <a:buAutoNum type="arabicPeriod"/>
+            <a:pPr lvl="1"/>
+            <a:r>
+              <a:rPr lang="en-US" b="0" i="0" dirty="0">
+                <a:solidFill>
+                  <a:srgbClr val="1C1917"/>
+                </a:solidFill>
+                <a:effectLst/>
+                <a:latin typeface="-apple-system"/>
+              </a:rPr>
+              <a:t>The basic syntax is:</a:t>
+            </a:r>
+          </a:p>
+          <a:p>
+            <a:pPr lvl="1"/>
+            <a:endParaRPr lang="en-US" dirty="0">
+              <a:solidFill>
+                <a:srgbClr val="1C1917"/>
+              </a:solidFill>
+              <a:latin typeface="-apple-system"/>
+            </a:endParaRPr>
+          </a:p>
+          <a:p>
+            <a:pPr marL="457200" lvl="1" indent="0">
+              <a:buNone/>
+            </a:pPr>
+            <a:r>
+              <a:rPr lang="en-US" b="0" i="0" dirty="0">
+                <a:solidFill>
+                  <a:srgbClr val="1C1917"/>
+                </a:solidFill>
+                <a:effectLst/>
+                <a:latin typeface="-apple-system"/>
+              </a:rPr>
+              <a:t>	</a:t>
+            </a:r>
+            <a:r>
+              <a:rPr lang="en-US" b="0" i="0" dirty="0">
+                <a:solidFill>
+                  <a:srgbClr val="C678DD"/>
+                </a:solidFill>
+                <a:effectLst/>
+                <a:latin typeface="Fira Code" panose="020B0809050000020004" pitchFamily="49" charset="0"/>
+              </a:rPr>
+              <a:t>SELECT</a:t>
+            </a:r>
+            <a:r>
+              <a:rPr lang="en-US" b="0" i="0" dirty="0">
+                <a:solidFill>
+                  <a:srgbClr val="ABB2BF"/>
+                </a:solidFill>
+                <a:effectLst/>
+                <a:latin typeface="Fira Code" panose="020B0809050000020004" pitchFamily="49" charset="0"/>
+              </a:rPr>
+              <a:t> </a:t>
+            </a:r>
+            <a:r>
+              <a:rPr lang="en-US" b="0" i="0" dirty="0">
+                <a:solidFill>
+                  <a:srgbClr val="61AFEF"/>
+                </a:solidFill>
+                <a:effectLst/>
+                <a:latin typeface="Fira Code" panose="020B0809050000020004" pitchFamily="49" charset="0"/>
+              </a:rPr>
+              <a:t>AVG</a:t>
+            </a:r>
+            <a:r>
+              <a:rPr lang="en-US" b="0" i="0" dirty="0">
+                <a:solidFill>
+                  <a:srgbClr val="ABB2BF"/>
+                </a:solidFill>
+                <a:effectLst/>
+                <a:latin typeface="Fira Code" panose="020B0809050000020004" pitchFamily="49" charset="0"/>
+              </a:rPr>
+              <a:t>(</a:t>
+            </a:r>
+            <a:r>
+              <a:rPr lang="en-US" b="0" i="0" dirty="0" err="1">
+                <a:solidFill>
+                  <a:srgbClr val="ABB2BF"/>
+                </a:solidFill>
+                <a:effectLst/>
+                <a:latin typeface="Fira Code" panose="020B0809050000020004" pitchFamily="49" charset="0"/>
+              </a:rPr>
+              <a:t>column_name</a:t>
+            </a:r>
+            <a:r>
+              <a:rPr lang="en-US" b="0" i="0" dirty="0">
+                <a:solidFill>
+                  <a:srgbClr val="ABB2BF"/>
+                </a:solidFill>
+                <a:effectLst/>
+                <a:latin typeface="Fira Code" panose="020B0809050000020004" pitchFamily="49" charset="0"/>
+              </a:rPr>
+              <a:t>) </a:t>
+            </a:r>
+            <a:r>
+              <a:rPr lang="en-US" b="0" i="0" dirty="0">
+                <a:solidFill>
+                  <a:srgbClr val="C678DD"/>
+                </a:solidFill>
+                <a:effectLst/>
+                <a:latin typeface="Fira Code" panose="020B0809050000020004" pitchFamily="49" charset="0"/>
+              </a:rPr>
+              <a:t>FROM</a:t>
+            </a:r>
+            <a:r>
+              <a:rPr lang="en-US" b="0" i="0" dirty="0">
+                <a:solidFill>
+                  <a:srgbClr val="ABB2BF"/>
+                </a:solidFill>
+                <a:effectLst/>
+                <a:latin typeface="Fira Code" panose="020B0809050000020004" pitchFamily="49" charset="0"/>
+              </a:rPr>
+              <a:t> </a:t>
+            </a:r>
+            <a:r>
+              <a:rPr lang="en-US" b="0" i="0" dirty="0" err="1">
+                <a:solidFill>
+                  <a:srgbClr val="ABB2BF"/>
+                </a:solidFill>
+                <a:effectLst/>
+                <a:latin typeface="Fira Code" panose="020B0809050000020004" pitchFamily="49" charset="0"/>
+              </a:rPr>
+              <a:t>table_name</a:t>
+            </a:r>
+            <a:r>
+              <a:rPr lang="en-US" b="0" i="0" dirty="0">
+                <a:solidFill>
+                  <a:srgbClr val="ABB2BF"/>
+                </a:solidFill>
+                <a:effectLst/>
+                <a:latin typeface="Fira Code" panose="020B0809050000020004" pitchFamily="49" charset="0"/>
+              </a:rPr>
+              <a:t>;</a:t>
+            </a:r>
+            <a:endParaRPr lang="en-US" dirty="0">
+              <a:solidFill>
+                <a:srgbClr val="ABB2BF"/>
+              </a:solidFill>
+              <a:latin typeface="Fira Code" panose="020B0809050000020004" pitchFamily="49" charset="0"/>
+            </a:endParaRPr>
+          </a:p>
+          <a:p>
+            <a:pPr marL="457200" lvl="1" indent="0">
+              <a:buNone/>
             </a:pPr>
             <a:endParaRPr lang="en-US" dirty="0">
               <a:solidFill>
-                <a:srgbClr val="24292F"/>
+                <a:srgbClr val="2D2D2D"/>
               </a:solidFill>
-              <a:latin typeface="-apple-system"/>
-            </a:endParaRPr>
-          </a:p>
-          <a:p>
-            <a:pPr marL="457200" indent="-457200" algn="l">
-              <a:buAutoNum type="arabicPeriod"/>
-            </a:pPr>
-            <a:endParaRPr lang="en-US" dirty="0">
-              <a:solidFill>
-                <a:srgbClr val="24292F"/>
-              </a:solidFill>
-              <a:latin typeface="-apple-system"/>
-            </a:endParaRPr>
-          </a:p>
-          <a:p>
-            <a:pPr marL="457200" indent="-457200" algn="l">
-              <a:buAutoNum type="arabicPeriod"/>
-            </a:pPr>
-            <a:endParaRPr lang="en-US" b="0" i="0" dirty="0">
-              <a:solidFill>
-                <a:srgbClr val="24292F"/>
-              </a:solidFill>
-              <a:effectLst/>
-              <a:latin typeface="-apple-system"/>
+              <a:latin typeface="oxygen" panose="020F0502020204030204" pitchFamily="34" charset="0"/>
             </a:endParaRPr>
           </a:p>
         </p:txBody>
@@ -6877,7 +7119,7 @@
     </p:spTree>
     <p:extLst>
       <p:ext uri="{BB962C8B-B14F-4D97-AF65-F5344CB8AC3E}">
-        <p14:creationId xmlns:p14="http://schemas.microsoft.com/office/powerpoint/2010/main" val="266973759"/>
+        <p14:creationId xmlns:p14="http://schemas.microsoft.com/office/powerpoint/2010/main" val="1453199819"/>
       </p:ext>
     </p:extLst>
   </p:cSld>
@@ -7134,7 +7376,7 @@
           <a:p>
             <a:r>
               <a:rPr lang="en-US" dirty="0"/>
-              <a:t>SQL Statement</a:t>
+              <a:t>Key Points</a:t>
             </a:r>
           </a:p>
         </p:txBody>
@@ -7165,229 +7407,239 @@
           <a:bodyPr/>
           <a:lstStyle/>
           <a:p>
-            <a:pPr marL="0" indent="0">
+            <a:pPr lvl="1"/>
+            <a:r>
+              <a:rPr lang="en-US" dirty="0">
+                <a:solidFill>
+                  <a:srgbClr val="1C1917"/>
+                </a:solidFill>
+                <a:latin typeface="-apple-system"/>
+              </a:rPr>
+              <a:t>C</a:t>
+            </a:r>
+            <a:r>
+              <a:rPr lang="en-US" b="0" i="0" dirty="0">
+                <a:solidFill>
+                  <a:srgbClr val="1C1917"/>
+                </a:solidFill>
+                <a:effectLst/>
+                <a:latin typeface="-apple-system"/>
+              </a:rPr>
+              <a:t>an be used with numeric, character, and date/time data types</a:t>
+            </a:r>
+          </a:p>
+          <a:p>
+            <a:pPr lvl="1"/>
+            <a:r>
+              <a:rPr lang="en-US" dirty="0">
+                <a:solidFill>
+                  <a:srgbClr val="1C1917"/>
+                </a:solidFill>
+                <a:latin typeface="-apple-system"/>
+              </a:rPr>
+              <a:t>I</a:t>
+            </a:r>
+            <a:r>
+              <a:rPr lang="en-US" b="0" i="0" dirty="0">
+                <a:solidFill>
+                  <a:srgbClr val="1C1917"/>
+                </a:solidFill>
+                <a:effectLst/>
+                <a:latin typeface="-apple-system"/>
+              </a:rPr>
+              <a:t>gnores NULL values when calculating the minimum value.</a:t>
+            </a:r>
+          </a:p>
+          <a:p>
+            <a:pPr lvl="1"/>
+            <a:r>
+              <a:rPr lang="en-US" dirty="0">
+                <a:solidFill>
+                  <a:srgbClr val="1C1917"/>
+                </a:solidFill>
+                <a:latin typeface="-apple-system"/>
+              </a:rPr>
+              <a:t>Can be used with WHERE and GROUP BY to find minimums of subsets of rows</a:t>
+            </a:r>
+          </a:p>
+          <a:p>
+            <a:pPr lvl="1"/>
+            <a:r>
+              <a:rPr lang="en-US" b="0" i="0" dirty="0">
+                <a:solidFill>
+                  <a:srgbClr val="1C1917"/>
+                </a:solidFill>
+                <a:effectLst/>
+                <a:latin typeface="-apple-system"/>
+              </a:rPr>
+              <a:t>Can also be combined with the DISTINCT keyword if you only want unique values considered:</a:t>
+            </a:r>
+          </a:p>
+          <a:p>
+            <a:pPr lvl="1"/>
+            <a:endParaRPr lang="en-US" b="0" i="0" dirty="0">
+              <a:solidFill>
+                <a:srgbClr val="1C1917"/>
+              </a:solidFill>
+              <a:effectLst/>
+              <a:latin typeface="-apple-system"/>
+            </a:endParaRPr>
+          </a:p>
+          <a:p>
+            <a:pPr marL="457200" lvl="1" indent="0">
               <a:buNone/>
             </a:pPr>
             <a:r>
-              <a:rPr lang="en-US" dirty="0">
+              <a:rPr lang="en-US" b="0" i="0" dirty="0">
+                <a:solidFill>
+                  <a:srgbClr val="C678DD"/>
+                </a:solidFill>
                 <a:effectLst/>
-                <a:latin typeface="Monaco" pitchFamily="2" charset="77"/>
+                <a:latin typeface="Fira Code" panose="020B0809050000020004" pitchFamily="49" charset="0"/>
               </a:rPr>
-              <a:t>The Syntax for the functions described:</a:t>
-            </a:r>
-          </a:p>
-          <a:p>
-            <a:pPr marL="0" indent="0" algn="ctr">
+              <a:t>		SELECT</a:t>
+            </a:r>
+            <a:r>
+              <a:rPr lang="en-US" b="0" i="0" dirty="0">
+                <a:solidFill>
+                  <a:srgbClr val="ABB2BF"/>
+                </a:solidFill>
+                <a:effectLst/>
+                <a:latin typeface="Fira Code" panose="020B0809050000020004" pitchFamily="49" charset="0"/>
+              </a:rPr>
+              <a:t> </a:t>
+            </a:r>
+            <a:r>
+              <a:rPr lang="en-US" b="0" i="0" dirty="0">
+                <a:solidFill>
+                  <a:srgbClr val="61AFEF"/>
+                </a:solidFill>
+                <a:effectLst/>
+                <a:latin typeface="Fira Code" panose="020B0809050000020004" pitchFamily="49" charset="0"/>
+              </a:rPr>
+              <a:t>MIN</a:t>
+            </a:r>
+            <a:r>
+              <a:rPr lang="en-US" b="0" i="0" dirty="0">
+                <a:solidFill>
+                  <a:srgbClr val="ABB2BF"/>
+                </a:solidFill>
+                <a:effectLst/>
+                <a:latin typeface="Fira Code" panose="020B0809050000020004" pitchFamily="49" charset="0"/>
+              </a:rPr>
+              <a:t>(</a:t>
+            </a:r>
+            <a:r>
+              <a:rPr lang="en-US" b="0" i="0" dirty="0">
+                <a:solidFill>
+                  <a:srgbClr val="C678DD"/>
+                </a:solidFill>
+                <a:effectLst/>
+                <a:latin typeface="Fira Code" panose="020B0809050000020004" pitchFamily="49" charset="0"/>
+              </a:rPr>
+              <a:t>DISTINCT</a:t>
+            </a:r>
+            <a:r>
+              <a:rPr lang="en-US" b="0" i="0" dirty="0">
+                <a:solidFill>
+                  <a:srgbClr val="ABB2BF"/>
+                </a:solidFill>
+                <a:effectLst/>
+                <a:latin typeface="Fira Code" panose="020B0809050000020004" pitchFamily="49" charset="0"/>
+              </a:rPr>
+              <a:t> </a:t>
+            </a:r>
+            <a:r>
+              <a:rPr lang="en-US" b="0" i="0" dirty="0" err="1">
+                <a:solidFill>
+                  <a:srgbClr val="ABB2BF"/>
+                </a:solidFill>
+                <a:effectLst/>
+                <a:latin typeface="Fira Code" panose="020B0809050000020004" pitchFamily="49" charset="0"/>
+              </a:rPr>
+              <a:t>column_name</a:t>
+            </a:r>
+            <a:r>
+              <a:rPr lang="en-US" b="0" i="0" dirty="0">
+                <a:solidFill>
+                  <a:srgbClr val="ABB2BF"/>
+                </a:solidFill>
+                <a:effectLst/>
+                <a:latin typeface="Fira Code" panose="020B0809050000020004" pitchFamily="49" charset="0"/>
+              </a:rPr>
+              <a:t>) </a:t>
+            </a:r>
+            <a:r>
+              <a:rPr lang="en-US" b="0" i="0" dirty="0">
+                <a:solidFill>
+                  <a:srgbClr val="C678DD"/>
+                </a:solidFill>
+                <a:effectLst/>
+                <a:latin typeface="Fira Code" panose="020B0809050000020004" pitchFamily="49" charset="0"/>
+              </a:rPr>
+              <a:t>FROM</a:t>
+            </a:r>
+            <a:r>
+              <a:rPr lang="en-US" b="0" i="0" dirty="0">
+                <a:solidFill>
+                  <a:srgbClr val="ABB2BF"/>
+                </a:solidFill>
+                <a:effectLst/>
+                <a:latin typeface="Fira Code" panose="020B0809050000020004" pitchFamily="49" charset="0"/>
+              </a:rPr>
+              <a:t> 				</a:t>
+            </a:r>
+            <a:r>
+              <a:rPr lang="en-US" b="0" i="0" dirty="0" err="1">
+                <a:solidFill>
+                  <a:srgbClr val="ABB2BF"/>
+                </a:solidFill>
+                <a:effectLst/>
+                <a:latin typeface="Fira Code" panose="020B0809050000020004" pitchFamily="49" charset="0"/>
+              </a:rPr>
+              <a:t>table_name</a:t>
+            </a:r>
+            <a:r>
+              <a:rPr lang="en-US" b="0" i="0" dirty="0">
+                <a:solidFill>
+                  <a:srgbClr val="ABB2BF"/>
+                </a:solidFill>
+                <a:effectLst/>
+                <a:latin typeface="Fira Code" panose="020B0809050000020004" pitchFamily="49" charset="0"/>
+              </a:rPr>
+              <a:t>;</a:t>
+            </a:r>
+          </a:p>
+          <a:p>
+            <a:pPr marL="457200" lvl="1" indent="0">
               <a:buNone/>
             </a:pPr>
             <a:endParaRPr lang="en-US" dirty="0">
-              <a:latin typeface="Monaco" pitchFamily="2" charset="77"/>
+              <a:solidFill>
+                <a:srgbClr val="ABB2BF"/>
+              </a:solidFill>
+              <a:latin typeface="Fira Code" panose="020B0809050000020004" pitchFamily="49" charset="0"/>
             </a:endParaRPr>
           </a:p>
           <a:p>
-            <a:pPr marL="0" indent="0" algn="ctr">
+            <a:pPr marL="457200" lvl="1" indent="0">
               <a:buNone/>
             </a:pPr>
-            <a:endParaRPr lang="en-US" dirty="0">
-              <a:latin typeface="Monaco" pitchFamily="2" charset="77"/>
+            <a:endParaRPr lang="en-US" b="0" i="0" dirty="0">
+              <a:solidFill>
+                <a:srgbClr val="1C1917"/>
+              </a:solidFill>
+              <a:effectLst/>
+              <a:latin typeface="-apple-system"/>
             </a:endParaRPr>
           </a:p>
           <a:p>
-            <a:pPr marL="0" indent="0">
-              <a:buNone/>
-            </a:pPr>
-            <a:r>
-              <a:rPr lang="en-US" dirty="0">
-                <a:effectLst/>
-                <a:latin typeface="Monaco" pitchFamily="2" charset="77"/>
-              </a:rPr>
-              <a:t>			</a:t>
-            </a:r>
-            <a:r>
-              <a:rPr lang="en-US" dirty="0">
-                <a:solidFill>
-                  <a:srgbClr val="00B050"/>
-                </a:solidFill>
-                <a:effectLst/>
-                <a:latin typeface="Monaco" pitchFamily="2" charset="77"/>
-              </a:rPr>
-              <a:t> SELECT </a:t>
-            </a:r>
-            <a:r>
-              <a:rPr lang="en-US" dirty="0">
-                <a:solidFill>
-                  <a:schemeClr val="tx2"/>
-                </a:solidFill>
-                <a:effectLst/>
-                <a:latin typeface="Monaco" pitchFamily="2" charset="77"/>
-              </a:rPr>
-              <a:t>MIN</a:t>
-            </a:r>
-            <a:r>
-              <a:rPr lang="en-US" dirty="0">
-                <a:solidFill>
-                  <a:schemeClr val="tx2"/>
-                </a:solidFill>
-                <a:latin typeface="Monaco" pitchFamily="2" charset="77"/>
-              </a:rPr>
-              <a:t>(</a:t>
-            </a:r>
-            <a:r>
-              <a:rPr lang="en-US" dirty="0" err="1">
-                <a:solidFill>
-                  <a:schemeClr val="tx2"/>
-                </a:solidFill>
-                <a:latin typeface="Monaco" pitchFamily="2" charset="77"/>
-              </a:rPr>
-              <a:t>Column_name</a:t>
-            </a:r>
-            <a:r>
-              <a:rPr lang="en-US" dirty="0">
-                <a:solidFill>
-                  <a:schemeClr val="tx2"/>
-                </a:solidFill>
-                <a:latin typeface="Monaco" pitchFamily="2" charset="77"/>
-              </a:rPr>
-              <a:t>),</a:t>
-            </a:r>
-          </a:p>
-          <a:p>
-            <a:pPr marL="0" indent="0">
-              <a:buNone/>
-            </a:pPr>
-            <a:r>
-              <a:rPr lang="en-US" dirty="0">
-                <a:solidFill>
-                  <a:schemeClr val="tx2"/>
-                </a:solidFill>
-                <a:effectLst/>
-                <a:latin typeface="Monaco" pitchFamily="2" charset="77"/>
-              </a:rPr>
-              <a:t>						 MAX</a:t>
-            </a:r>
-            <a:r>
-              <a:rPr lang="en-US" dirty="0">
-                <a:solidFill>
-                  <a:schemeClr val="tx2"/>
-                </a:solidFill>
-                <a:latin typeface="Monaco" pitchFamily="2" charset="77"/>
-              </a:rPr>
-              <a:t>(</a:t>
-            </a:r>
-            <a:r>
-              <a:rPr lang="en-US" dirty="0" err="1">
-                <a:solidFill>
-                  <a:schemeClr val="tx2"/>
-                </a:solidFill>
-                <a:latin typeface="Monaco" pitchFamily="2" charset="77"/>
-              </a:rPr>
-              <a:t>Column_name</a:t>
-            </a:r>
-            <a:r>
-              <a:rPr lang="en-US" dirty="0">
-                <a:solidFill>
-                  <a:schemeClr val="tx2"/>
-                </a:solidFill>
-                <a:latin typeface="Monaco" pitchFamily="2" charset="77"/>
-              </a:rPr>
-              <a:t>),</a:t>
-            </a:r>
-          </a:p>
-          <a:p>
-            <a:pPr marL="0" indent="0">
-              <a:buNone/>
-            </a:pPr>
-            <a:r>
-              <a:rPr lang="en-US" dirty="0">
-                <a:solidFill>
-                  <a:schemeClr val="tx2"/>
-                </a:solidFill>
-                <a:effectLst/>
-                <a:latin typeface="Monaco" pitchFamily="2" charset="77"/>
-              </a:rPr>
-              <a:t>						 AVG</a:t>
-            </a:r>
-            <a:r>
-              <a:rPr lang="en-US" dirty="0">
-                <a:solidFill>
-                  <a:schemeClr val="tx2"/>
-                </a:solidFill>
-                <a:latin typeface="Monaco" pitchFamily="2" charset="77"/>
-              </a:rPr>
-              <a:t>(</a:t>
-            </a:r>
-            <a:r>
-              <a:rPr lang="en-US" dirty="0" err="1">
-                <a:solidFill>
-                  <a:schemeClr val="tx2"/>
-                </a:solidFill>
-                <a:latin typeface="Monaco" pitchFamily="2" charset="77"/>
-              </a:rPr>
-              <a:t>Column_name</a:t>
-            </a:r>
-            <a:r>
-              <a:rPr lang="en-US" dirty="0">
-                <a:solidFill>
-                  <a:schemeClr val="tx2"/>
-                </a:solidFill>
-                <a:latin typeface="Monaco" pitchFamily="2" charset="77"/>
-              </a:rPr>
-              <a:t>)</a:t>
-            </a:r>
-          </a:p>
-          <a:p>
-            <a:pPr marL="0" indent="0">
-              <a:buNone/>
-            </a:pPr>
-            <a:r>
-              <a:rPr lang="en-US" dirty="0">
-                <a:latin typeface="Monaco" pitchFamily="2" charset="77"/>
-              </a:rPr>
-              <a:t> 			</a:t>
-            </a:r>
-            <a:r>
-              <a:rPr lang="en-US" dirty="0">
-                <a:solidFill>
-                  <a:srgbClr val="FF0000"/>
-                </a:solidFill>
-                <a:latin typeface="Monaco" pitchFamily="2" charset="77"/>
-              </a:rPr>
-              <a:t> </a:t>
-            </a:r>
-            <a:r>
-              <a:rPr lang="en-US" dirty="0">
-                <a:solidFill>
-                  <a:srgbClr val="00B050"/>
-                </a:solidFill>
-                <a:effectLst/>
-                <a:latin typeface="Monaco" pitchFamily="2" charset="77"/>
-              </a:rPr>
-              <a:t>FROM</a:t>
-            </a:r>
-            <a:r>
-              <a:rPr lang="en-US" dirty="0">
-                <a:solidFill>
-                  <a:srgbClr val="FF0000"/>
-                </a:solidFill>
-                <a:latin typeface="Monaco" pitchFamily="2" charset="77"/>
-              </a:rPr>
-              <a:t> </a:t>
-            </a:r>
-            <a:r>
-              <a:rPr lang="en-US" dirty="0" err="1">
-                <a:solidFill>
-                  <a:schemeClr val="tx2"/>
-                </a:solidFill>
-                <a:effectLst/>
-                <a:latin typeface="Monaco" pitchFamily="2" charset="77"/>
-              </a:rPr>
-              <a:t>Table_name</a:t>
-            </a:r>
+            <a:pPr lvl="1"/>
             <a:endParaRPr lang="en-US" dirty="0">
               <a:solidFill>
-                <a:schemeClr val="tx2"/>
+                <a:srgbClr val="2D2D2D"/>
               </a:solidFill>
-              <a:latin typeface="Monaco" pitchFamily="2" charset="77"/>
+              <a:latin typeface="oxygen" panose="020F0502020204030204" pitchFamily="34" charset="0"/>
             </a:endParaRPr>
           </a:p>
         </p:txBody>
@@ -7395,7 +7647,7 @@
     </p:spTree>
     <p:extLst>
       <p:ext uri="{BB962C8B-B14F-4D97-AF65-F5344CB8AC3E}">
-        <p14:creationId xmlns:p14="http://schemas.microsoft.com/office/powerpoint/2010/main" val="2904280872"/>
+        <p14:creationId xmlns:p14="http://schemas.microsoft.com/office/powerpoint/2010/main" val="1261645926"/>
       </p:ext>
     </p:extLst>
   </p:cSld>
@@ -7707,21 +7959,7 @@
                 </a:solidFill>
                 <a:latin typeface="-apple-system"/>
               </a:rPr>
-              <a:t>Define Function</a:t>
-            </a:r>
-          </a:p>
-          <a:p>
-            <a:pPr marL="457200" indent="-457200" algn="l">
-              <a:buAutoNum type="arabicPeriod"/>
-            </a:pPr>
-            <a:r>
-              <a:rPr lang="en-US" dirty="0">
-                <a:solidFill>
-                  <a:srgbClr val="24292F"/>
-                </a:solidFill>
-                <a:latin typeface="-apple-system"/>
-              </a:rPr>
-              <a:t>SQL Context</a:t>
+              <a:t>Define Min, Max, and AVG Functions</a:t>
             </a:r>
           </a:p>
           <a:p>
@@ -7788,7 +8026,7 @@
     </p:spTree>
     <p:extLst>
       <p:ext uri="{BB962C8B-B14F-4D97-AF65-F5344CB8AC3E}">
-        <p14:creationId xmlns:p14="http://schemas.microsoft.com/office/powerpoint/2010/main" val="950089832"/>
+        <p14:creationId xmlns:p14="http://schemas.microsoft.com/office/powerpoint/2010/main" val="266973759"/>
       </p:ext>
     </p:extLst>
   </p:cSld>
@@ -8078,6 +8316,15 @@
           <a:p>
             <a:pPr algn="l"/>
             <a:r>
+              <a:rPr lang="en-US" dirty="0">
+                <a:solidFill>
+                  <a:srgbClr val="24292F"/>
+                </a:solidFill>
+                <a:latin typeface="-apple-system"/>
+              </a:rPr>
+              <a:t>U</a:t>
+            </a:r>
+            <a:r>
               <a:rPr lang="en-US" b="0" i="0" dirty="0">
                 <a:solidFill>
                   <a:srgbClr val="24292F"/>
@@ -8085,7 +8332,7 @@
                 <a:effectLst/>
                 <a:latin typeface="-apple-system"/>
               </a:rPr>
-              <a:t>We will be using the World Wide Importers Database</a:t>
+              <a:t>sing the World Wide Importers Database</a:t>
             </a:r>
           </a:p>
           <a:p>
@@ -8567,6 +8814,18 @@
             </a:r>
           </a:p>
           <a:p>
+            <a:pPr marL="0" indent="0">
+              <a:buNone/>
+            </a:pPr>
+            <a:endParaRPr lang="en-US" b="0" i="0" dirty="0">
+              <a:solidFill>
+                <a:srgbClr val="2D2D2D"/>
+              </a:solidFill>
+              <a:effectLst/>
+              <a:latin typeface="oxygen" panose="020F0502020204030204" pitchFamily="34" charset="0"/>
+            </a:endParaRPr>
+          </a:p>
+          <a:p>
             <a:pPr lvl="1"/>
             <a:r>
               <a:rPr lang="en-US" b="0" i="0" dirty="0">
@@ -8953,13 +9212,15 @@
             </a:endParaRPr>
           </a:p>
           <a:p>
-            <a:pPr lvl="1"/>
+            <a:pPr marL="457200" lvl="1" indent="0">
+              <a:buNone/>
+            </a:pPr>
             <a:r>
               <a:rPr lang="en-US" dirty="0">
                 <a:effectLst/>
                 <a:latin typeface="Monaco" pitchFamily="2" charset="77"/>
               </a:rPr>
-              <a:t>SELECT</a:t>
+              <a:t>  SELECT</a:t>
             </a:r>
             <a:r>
               <a:rPr lang="en-US" dirty="0">
@@ -8982,7 +9243,7 @@
             </a:r>
           </a:p>
           <a:p>
-            <a:pPr marL="914400" lvl="2" indent="0">
+            <a:pPr marL="457200" lvl="1" indent="0">
               <a:buNone/>
             </a:pPr>
             <a:r>
@@ -8990,7 +9251,7 @@
                 <a:effectLst/>
                 <a:latin typeface="Monaco" pitchFamily="2" charset="77"/>
               </a:rPr>
-              <a:t>MAX</a:t>
+              <a:t>  MAX</a:t>
             </a:r>
             <a:r>
               <a:rPr lang="en-US" dirty="0">
@@ -9000,7 +9261,7 @@
             </a:r>
           </a:p>
           <a:p>
-            <a:pPr marL="914400" lvl="2" indent="0">
+            <a:pPr marL="457200" lvl="1" indent="0">
               <a:buNone/>
             </a:pPr>
             <a:r>
@@ -9008,26 +9269,31 @@
                 <a:effectLst/>
                 <a:latin typeface="Monaco" pitchFamily="2" charset="77"/>
               </a:rPr>
-              <a:t>AVG</a:t>
+              <a:t>  AVG</a:t>
             </a:r>
             <a:r>
               <a:rPr lang="en-US" dirty="0">
                 <a:latin typeface="Monaco" pitchFamily="2" charset="77"/>
               </a:rPr>
-              <a:t>(Temperature) </a:t>
+              <a:t>(Temperature)</a:t>
+            </a:r>
+          </a:p>
+          <a:p>
+            <a:pPr marL="457200" lvl="1" indent="0">
+              <a:buNone/>
+            </a:pPr>
+            <a:r>
+              <a:rPr lang="en-US" dirty="0">
+                <a:latin typeface="Monaco" pitchFamily="2" charset="77"/>
+              </a:rPr>
+              <a:t>  </a:t>
             </a:r>
             <a:r>
               <a:rPr lang="en-US" dirty="0">
                 <a:effectLst/>
                 <a:latin typeface="Monaco" pitchFamily="2" charset="77"/>
               </a:rPr>
-              <a:t>FROM</a:t>
-            </a:r>
-            <a:r>
-              <a:rPr lang="en-US" dirty="0">
-                <a:latin typeface="Monaco" pitchFamily="2" charset="77"/>
-              </a:rPr>
-              <a:t> </a:t>
+              <a:t>FROM </a:t>
             </a:r>
             <a:r>
               <a:rPr lang="en-US" dirty="0" err="1">
@@ -9049,6 +9315,23 @@
               </a:rPr>
               <a:t>ColdRoomTemperatures</a:t>
             </a:r>
+            <a:endParaRPr lang="en-US" dirty="0">
+              <a:effectLst/>
+              <a:latin typeface="Monaco" pitchFamily="2" charset="77"/>
+            </a:endParaRPr>
+          </a:p>
+          <a:p>
+            <a:pPr marL="457200" lvl="1" indent="0">
+              <a:buNone/>
+            </a:pPr>
+            <a:endParaRPr lang="en-US" dirty="0">
+              <a:latin typeface="Monaco" pitchFamily="2" charset="77"/>
+            </a:endParaRPr>
+          </a:p>
+          <a:p>
+            <a:pPr marL="457200" lvl="1" indent="0">
+              <a:buNone/>
+            </a:pPr>
             <a:endParaRPr lang="en-US" dirty="0">
               <a:effectLst/>
               <a:latin typeface="Monaco" pitchFamily="2" charset="77"/>
@@ -9103,10 +9386,16 @@
           <p:cNvGraphicFramePr>
             <a:graphicFrameLocks noGrp="1"/>
           </p:cNvGraphicFramePr>
-          <p:nvPr/>
+          <p:nvPr>
+            <p:extLst>
+              <p:ext uri="{D42A27DB-BD31-4B8C-83A1-F6EECF244321}">
+                <p14:modId xmlns:p14="http://schemas.microsoft.com/office/powerpoint/2010/main" val="774890917"/>
+              </p:ext>
+            </p:extLst>
+          </p:nvPr>
         </p:nvGraphicFramePr>
         <p:xfrm>
-          <a:off x="628650" y="3612674"/>
+          <a:off x="742950" y="4218155"/>
           <a:ext cx="7886700" cy="777240"/>
         </p:xfrm>
         <a:graphic>
@@ -9143,10 +9432,10 @@
                     <a:lstStyle/>
                     <a:p>
                       <a:r>
-                        <a:rPr lang="en-US">
+                        <a:rPr lang="en-US" dirty="0">
                           <a:effectLst/>
                         </a:rPr>
-                        <a:t>(No column name)</a:t>
+                        <a:t>Min Value</a:t>
                       </a:r>
                     </a:p>
                   </a:txBody>
@@ -9174,10 +9463,10 @@
                     <a:lstStyle/>
                     <a:p>
                       <a:r>
-                        <a:rPr lang="en-US">
+                        <a:rPr lang="en-US" dirty="0">
                           <a:effectLst/>
                         </a:rPr>
-                        <a:t>(No column name)</a:t>
+                        <a:t>Max Value</a:t>
                       </a:r>
                     </a:p>
                   </a:txBody>
@@ -9205,10 +9494,10 @@
                     <a:lstStyle/>
                     <a:p>
                       <a:r>
-                        <a:rPr lang="en-US">
+                        <a:rPr lang="en-US" dirty="0">
                           <a:effectLst/>
                         </a:rPr>
-                        <a:t>(No column name)</a:t>
+                        <a:t>Average Value</a:t>
                       </a:r>
                     </a:p>
                   </a:txBody>
@@ -9243,7 +9532,7 @@
                     <a:lstStyle/>
                     <a:p>
                       <a:r>
-                        <a:rPr lang="en-US">
+                        <a:rPr lang="en-US" dirty="0">
                           <a:effectLst/>
                         </a:rPr>
                         <a:t>3.00</a:t>
@@ -10422,7 +10711,7 @@
               <a:buAutoNum type="arabicPeriod"/>
             </a:pPr>
             <a:r>
-              <a:rPr lang="en-US" dirty="0">
+              <a:rPr lang="en-US" b="1" dirty="0">
                 <a:solidFill>
                   <a:srgbClr val="24292F"/>
                 </a:solidFill>
@@ -10442,8 +10731,34 @@
                 </a:solidFill>
                 <a:latin typeface="-apple-system"/>
               </a:rPr>
-              <a:t>Define Function</a:t>
-            </a:r>
+              <a:t>Define Min, Max, and AVG Functions</a:t>
+            </a:r>
+          </a:p>
+          <a:p>
+            <a:pPr marL="457200" indent="-457200">
+              <a:buFont typeface="Arial" panose="020B0604020202020204" pitchFamily="34" charset="0"/>
+              <a:buAutoNum type="arabicPeriod"/>
+            </a:pPr>
+            <a:r>
+              <a:rPr lang="en-US" dirty="0">
+                <a:solidFill>
+                  <a:srgbClr val="24292F"/>
+                </a:solidFill>
+                <a:latin typeface="-apple-system"/>
+              </a:rPr>
+              <a:t>Exercise 1</a:t>
+            </a:r>
+          </a:p>
+          <a:p>
+            <a:pPr marL="457200" indent="-457200" algn="l">
+              <a:buAutoNum type="arabicPeriod"/>
+            </a:pPr>
+            <a:endParaRPr lang="en-US" dirty="0">
+              <a:solidFill>
+                <a:srgbClr val="24292F"/>
+              </a:solidFill>
+              <a:latin typeface="-apple-system"/>
+            </a:endParaRPr>
           </a:p>
           <a:p>
             <a:pPr marL="457200" indent="-457200" algn="l">
@@ -11932,8 +12247,34 @@
                 </a:solidFill>
                 <a:latin typeface="-apple-system"/>
               </a:rPr>
-              <a:t>Define Function</a:t>
-            </a:r>
+              <a:t>Define Min, Max, and AVG Functions</a:t>
+            </a:r>
+          </a:p>
+          <a:p>
+            <a:pPr marL="457200" indent="-457200">
+              <a:buFont typeface="Arial" panose="020B0604020202020204" pitchFamily="34" charset="0"/>
+              <a:buAutoNum type="arabicPeriod"/>
+            </a:pPr>
+            <a:r>
+              <a:rPr lang="en-US" dirty="0">
+                <a:solidFill>
+                  <a:srgbClr val="24292F"/>
+                </a:solidFill>
+                <a:latin typeface="-apple-system"/>
+              </a:rPr>
+              <a:t>Exercise 1</a:t>
+            </a:r>
+          </a:p>
+          <a:p>
+            <a:pPr marL="457200" indent="-457200" algn="l">
+              <a:buAutoNum type="arabicPeriod"/>
+            </a:pPr>
+            <a:endParaRPr lang="en-US" dirty="0">
+              <a:solidFill>
+                <a:srgbClr val="24292F"/>
+              </a:solidFill>
+              <a:latin typeface="-apple-system"/>
+            </a:endParaRPr>
           </a:p>
           <a:p>
             <a:pPr marL="0" indent="0" algn="l">
@@ -12231,7 +12572,7 @@
           <a:p>
             <a:r>
               <a:rPr lang="en-US" dirty="0"/>
-              <a:t>Function 1</a:t>
+              <a:t>Aggregate Functions</a:t>
             </a:r>
           </a:p>
         </p:txBody>
@@ -12273,21 +12614,99 @@
                 <a:effectLst/>
                 <a:latin typeface="-apple-system"/>
               </a:rPr>
-              <a:t>Min Function</a:t>
-            </a:r>
+              <a:t>What is an Aggregate function?</a:t>
+            </a:r>
+          </a:p>
+          <a:p>
+            <a:pPr marL="0" indent="0" algn="l">
+              <a:buNone/>
+            </a:pPr>
+            <a:r>
+              <a:rPr lang="en-US" dirty="0">
+                <a:solidFill>
+                  <a:srgbClr val="24292F"/>
+                </a:solidFill>
+                <a:latin typeface="-apple-system"/>
+              </a:rPr>
+              <a:t>	</a:t>
+            </a:r>
+            <a:endParaRPr lang="en-US" b="0" i="0" dirty="0">
+              <a:solidFill>
+                <a:srgbClr val="24292F"/>
+              </a:solidFill>
+              <a:effectLst/>
+              <a:latin typeface="-apple-system"/>
+            </a:endParaRPr>
           </a:p>
           <a:p>
             <a:pPr lvl="1"/>
             <a:r>
               <a:rPr lang="en-US" b="0" i="0" dirty="0">
                 <a:solidFill>
-                  <a:srgbClr val="2D2D2D"/>
+                  <a:srgbClr val="1C1917"/>
                 </a:solidFill>
                 <a:effectLst/>
-                <a:latin typeface="oxygen" panose="020F0502020204030204" pitchFamily="34" charset="0"/>
+                <a:latin typeface="-apple-system"/>
               </a:rPr>
-              <a:t>This returns the smallest value in a given column.</a:t>
-            </a:r>
+              <a:t>Remember a SQL function is a reusable block of SQL code that can be called/invoked to perform a specific task in a database</a:t>
+            </a:r>
+          </a:p>
+          <a:p>
+            <a:pPr marL="457200" lvl="1" indent="0">
+              <a:buNone/>
+            </a:pPr>
+            <a:endParaRPr lang="en-US" dirty="0">
+              <a:solidFill>
+                <a:srgbClr val="2D2D2D"/>
+              </a:solidFill>
+              <a:latin typeface="oxygen" panose="020F0502020204030204" pitchFamily="34" charset="0"/>
+            </a:endParaRPr>
+          </a:p>
+          <a:p>
+            <a:pPr lvl="1"/>
+            <a:r>
+              <a:rPr lang="en-US" b="1" i="0" dirty="0">
+                <a:solidFill>
+                  <a:srgbClr val="1C1917"/>
+                </a:solidFill>
+                <a:effectLst/>
+                <a:latin typeface="-apple-system"/>
+              </a:rPr>
+              <a:t>Aggregate functions </a:t>
+            </a:r>
+            <a:r>
+              <a:rPr lang="en-US" b="0" i="0" dirty="0">
+                <a:solidFill>
+                  <a:srgbClr val="1C1917"/>
+                </a:solidFill>
+                <a:effectLst/>
+                <a:latin typeface="-apple-system"/>
+              </a:rPr>
+              <a:t>- Perform a calculation on a set of values and return a single value</a:t>
+            </a:r>
+          </a:p>
+          <a:p>
+            <a:pPr lvl="2"/>
+            <a:r>
+              <a:rPr lang="en-US" b="0" i="0" dirty="0">
+                <a:solidFill>
+                  <a:srgbClr val="1C1917"/>
+                </a:solidFill>
+                <a:effectLst/>
+                <a:latin typeface="-apple-system"/>
+              </a:rPr>
+              <a:t>Examples: COUNT(), MAX(), AVG()</a:t>
+            </a:r>
+          </a:p>
+          <a:p>
+            <a:pPr lvl="1"/>
+            <a:endParaRPr lang="en-US" b="0" i="0" dirty="0">
+              <a:solidFill>
+                <a:srgbClr val="2D2D2D"/>
+              </a:solidFill>
+              <a:effectLst/>
+              <a:latin typeface="oxygen" panose="020F0502020204030204" pitchFamily="34" charset="0"/>
+            </a:endParaRPr>
           </a:p>
           <a:p>
             <a:pPr lvl="1"/>
@@ -12303,7 +12722,7 @@
     </p:spTree>
     <p:extLst>
       <p:ext uri="{BB962C8B-B14F-4D97-AF65-F5344CB8AC3E}">
-        <p14:creationId xmlns:p14="http://schemas.microsoft.com/office/powerpoint/2010/main" val="2153913192"/>
+        <p14:creationId xmlns:p14="http://schemas.microsoft.com/office/powerpoint/2010/main" val="1213066299"/>
       </p:ext>
     </p:extLst>
   </p:cSld>
@@ -14176,12 +14595,6 @@
 </file>
 
 <file path=customXml/item1.xml><?xml version="1.0" encoding="utf-8"?>
-<p:properties xmlns:p="http://schemas.microsoft.com/office/2006/metadata/properties" xmlns:xsi="http://www.w3.org/2001/XMLSchema-instance" xmlns:pc="http://schemas.microsoft.com/office/infopath/2007/PartnerControls">
-  <documentManagement/>
-</p:properties>
-</file>
-
-<file path=customXml/item2.xml><?xml version="1.0" encoding="utf-8"?>
 <ct:contentTypeSchema xmlns:ct="http://schemas.microsoft.com/office/2006/metadata/contentType" xmlns:ma="http://schemas.microsoft.com/office/2006/metadata/properties/metaAttributes" ct:_="" ma:_="" ma:contentTypeName="Document" ma:contentTypeID="0x010100D717D047DAB2764FBE8B85865ADF125C" ma:contentTypeVersion="0" ma:contentTypeDescription="Create a new document." ma:contentTypeScope="" ma:versionID="3154522c01a2510568c44eaa3f86772f">
   <xsd:schema xmlns:xsd="http://www.w3.org/2001/XMLSchema" xmlns:xs="http://www.w3.org/2001/XMLSchema" xmlns:p="http://schemas.microsoft.com/office/2006/metadata/properties" targetNamespace="http://schemas.microsoft.com/office/2006/metadata/properties" ma:root="true" ma:fieldsID="1b05d82d297216baf5b26c55225140df">
     <xsd:element name="properties">
@@ -14295,6 +14708,12 @@
 </ct:contentTypeSchema>
 </file>
 
+<file path=customXml/item2.xml><?xml version="1.0" encoding="utf-8"?>
+<p:properties xmlns:p="http://schemas.microsoft.com/office/2006/metadata/properties" xmlns:xsi="http://www.w3.org/2001/XMLSchema-instance" xmlns:pc="http://schemas.microsoft.com/office/infopath/2007/PartnerControls">
+  <documentManagement/>
+</p:properties>
+</file>
+
 <file path=customXml/item3.xml><?xml version="1.0" encoding="utf-8"?>
 <?mso-contentType ?>
 <FormTemplates xmlns="http://schemas.microsoft.com/sharepoint/v3/contenttype/forms">
@@ -14305,21 +14724,6 @@
 </file>
 
 <file path=customXml/itemProps1.xml><?xml version="1.0" encoding="utf-8"?>
-<ds:datastoreItem xmlns:ds="http://schemas.openxmlformats.org/officeDocument/2006/customXml" ds:itemID="{C530F82F-BEB8-4CE5-BAAE-EC5C7B644B7C}">
-  <ds:schemaRefs>
-    <ds:schemaRef ds:uri="http://schemas.microsoft.com/office/2006/documentManagement/types"/>
-    <ds:schemaRef ds:uri="http://schemas.microsoft.com/office/2006/metadata/properties"/>
-    <ds:schemaRef ds:uri="http://www.w3.org/XML/1998/namespace"/>
-    <ds:schemaRef ds:uri="http://purl.org/dc/elements/1.1/"/>
-    <ds:schemaRef ds:uri="http://purl.org/dc/dcmitype/"/>
-    <ds:schemaRef ds:uri="http://purl.org/dc/terms/"/>
-    <ds:schemaRef ds:uri="http://schemas.microsoft.com/office/infopath/2007/PartnerControls"/>
-    <ds:schemaRef ds:uri="http://schemas.openxmlformats.org/package/2006/metadata/core-properties"/>
-  </ds:schemaRefs>
-</ds:datastoreItem>
-</file>
-
-<file path=customXml/itemProps2.xml><?xml version="1.0" encoding="utf-8"?>
 <ds:datastoreItem xmlns:ds="http://schemas.openxmlformats.org/officeDocument/2006/customXml" ds:itemID="{959784AE-7718-4684-9BBC-9AAC52D5A526}">
   <ds:schemaRefs>
     <ds:schemaRef ds:uri="http://schemas.microsoft.com/office/2006/metadata/contentType"/>
@@ -14335,6 +14739,21 @@
 </ds:datastoreItem>
 </file>
 
+<file path=customXml/itemProps2.xml><?xml version="1.0" encoding="utf-8"?>
+<ds:datastoreItem xmlns:ds="http://schemas.openxmlformats.org/officeDocument/2006/customXml" ds:itemID="{C530F82F-BEB8-4CE5-BAAE-EC5C7B644B7C}">
+  <ds:schemaRefs>
+    <ds:schemaRef ds:uri="http://schemas.microsoft.com/office/2006/documentManagement/types"/>
+    <ds:schemaRef ds:uri="http://schemas.microsoft.com/office/2006/metadata/properties"/>
+    <ds:schemaRef ds:uri="http://www.w3.org/XML/1998/namespace"/>
+    <ds:schemaRef ds:uri="http://purl.org/dc/elements/1.1/"/>
+    <ds:schemaRef ds:uri="http://purl.org/dc/dcmitype/"/>
+    <ds:schemaRef ds:uri="http://purl.org/dc/terms/"/>
+    <ds:schemaRef ds:uri="http://schemas.microsoft.com/office/infopath/2007/PartnerControls"/>
+    <ds:schemaRef ds:uri="http://schemas.openxmlformats.org/package/2006/metadata/core-properties"/>
+  </ds:schemaRefs>
+</ds:datastoreItem>
+</file>
+
 <file path=customXml/itemProps3.xml><?xml version="1.0" encoding="utf-8"?>
 <ds:datastoreItem xmlns:ds="http://schemas.openxmlformats.org/officeDocument/2006/customXml" ds:itemID="{E49E43F2-009D-4FD5-9629-B1B9A3DF71DA}">
   <ds:schemaRefs>

</xml_diff>